<commit_message>
Slightly modified the image.
</commit_message>
<xml_diff>
--- a/ch02/ex.2.1.pptx
+++ b/ch02/ex.2.1.pptx
@@ -4073,7 +4073,7 @@
         </p:nvSpPr>
         <p:spPr>
           <a:xfrm>
-            <a:off x="1249962" y="932770"/>
+            <a:off x="1249962" y="905222"/>
             <a:ext cx="457176" cy="338554"/>
           </a:xfrm>
           <a:prstGeom prst="rect">
@@ -4116,7 +4116,7 @@
         </p:nvSpPr>
         <p:spPr>
           <a:xfrm>
-            <a:off x="23664" y="223119"/>
+            <a:off x="23664" y="206628"/>
             <a:ext cx="1683474" cy="338554"/>
           </a:xfrm>
           <a:prstGeom prst="rect">
@@ -4562,10 +4562,6 @@
                 </a:rPr>
                 <a:t>・</a:t>
               </a:r>
-              <a:endParaRPr lang="ja-JP" altLang="en-US" sz="1600" dirty="0">
-                <a:latin typeface="源ノ角ゴシック Code JP R" pitchFamily="34" charset="-128"/>
-                <a:ea typeface="源ノ角ゴシック Code JP R" pitchFamily="34" charset="-128"/>
-              </a:endParaRPr>
             </a:p>
           </p:txBody>
         </p:sp>
@@ -4778,9 +4774,9 @@
           <p:nvPr/>
         </p:nvCxnSpPr>
         <p:spPr>
-          <a:xfrm flipV="1">
-            <a:off x="2700000" y="381673"/>
-            <a:ext cx="360000" cy="373"/>
+          <a:xfrm>
+            <a:off x="2519749" y="359999"/>
+            <a:ext cx="540251" cy="0"/>
           </a:xfrm>
           <a:prstGeom prst="line">
             <a:avLst/>
@@ -4812,8 +4808,8 @@
         </p:nvCxnSpPr>
         <p:spPr>
           <a:xfrm>
-            <a:off x="3780000" y="382046"/>
-            <a:ext cx="360000" cy="0"/>
+            <a:off x="3600000" y="382046"/>
+            <a:ext cx="540000" cy="0"/>
           </a:xfrm>
           <a:prstGeom prst="line">
             <a:avLst/>
@@ -4840,15 +4836,13 @@
       <p:cxnSp>
         <p:nvCxnSpPr>
           <p:cNvPr id="169" name="直線コネクタ 168"/>
-          <p:cNvCxnSpPr>
-            <a:endCxn id="160" idx="1"/>
-          </p:cNvCxnSpPr>
+          <p:cNvCxnSpPr/>
           <p:nvPr/>
         </p:nvCxnSpPr>
         <p:spPr>
           <a:xfrm flipV="1">
-            <a:off x="4860000" y="360000"/>
-            <a:ext cx="348654" cy="374"/>
+            <a:off x="4680000" y="360000"/>
+            <a:ext cx="540000" cy="374"/>
           </a:xfrm>
           <a:prstGeom prst="line">
             <a:avLst/>
@@ -5528,10 +5522,6 @@
                 </a:rPr>
                 <a:t>・</a:t>
               </a:r>
-              <a:endParaRPr lang="ja-JP" altLang="en-US" sz="1600" dirty="0">
-                <a:latin typeface="源ノ角ゴシック Code JP R" pitchFamily="34" charset="-128"/>
-                <a:ea typeface="源ノ角ゴシック Code JP R" pitchFamily="34" charset="-128"/>
-              </a:endParaRPr>
             </a:p>
           </p:txBody>
         </p:sp>
@@ -5752,8 +5742,8 @@
         </p:nvCxnSpPr>
         <p:spPr>
           <a:xfrm flipV="1">
-            <a:off x="2700000" y="1102047"/>
-            <a:ext cx="360000" cy="373"/>
+            <a:off x="2520000" y="1080000"/>
+            <a:ext cx="540000" cy="373"/>
           </a:xfrm>
           <a:prstGeom prst="line">
             <a:avLst/>
@@ -5785,8 +5775,8 @@
         </p:nvCxnSpPr>
         <p:spPr>
           <a:xfrm>
-            <a:off x="3780000" y="1102420"/>
-            <a:ext cx="360000" cy="0"/>
+            <a:off x="3600000" y="1080000"/>
+            <a:ext cx="540000" cy="0"/>
           </a:xfrm>
           <a:prstGeom prst="line">
             <a:avLst/>
@@ -5813,15 +5803,13 @@
       <p:cxnSp>
         <p:nvCxnSpPr>
           <p:cNvPr id="178" name="直線コネクタ 177"/>
-          <p:cNvCxnSpPr>
-            <a:endCxn id="186" idx="1"/>
-          </p:cNvCxnSpPr>
+          <p:cNvCxnSpPr/>
           <p:nvPr/>
         </p:nvCxnSpPr>
         <p:spPr>
           <a:xfrm flipV="1">
-            <a:off x="4860000" y="1080000"/>
-            <a:ext cx="348654" cy="374"/>
+            <a:off x="4680000" y="1080000"/>
+            <a:ext cx="540000" cy="374"/>
           </a:xfrm>
           <a:prstGeom prst="line">
             <a:avLst/>
@@ -5853,7 +5841,7 @@
         </p:nvCxnSpPr>
         <p:spPr>
           <a:xfrm>
-            <a:off x="1620000" y="1102420"/>
+            <a:off x="1620000" y="1080000"/>
             <a:ext cx="360000" cy="0"/>
           </a:xfrm>
           <a:prstGeom prst="line">

</xml_diff>